<commit_message>
Make small fix to the generator function.
</commit_message>
<xml_diff>
--- a/class-notes/cs321-winter-2023-lecture-9-streams-and-iterators.pptx
+++ b/class-notes/cs321-winter-2023-lecture-9-streams-and-iterators.pptx
@@ -25668,7 +25668,7 @@
     <p:bg>
       <p:bgPr>
         <a:solidFill>
-          <a:schemeClr val="bg1"/>
+          <a:schemeClr val="accent1"/>
         </a:solidFill>
         <a:effectLst/>
       </p:bgPr>
@@ -25689,10 +25689,10 @@
       </p:grpSpPr>
       <p:sp>
         <p:nvSpPr>
-          <p:cNvPr id="8" name="Rectangle 7">
+          <p:cNvPr id="17" name="Rectangle 16">
             <a:extLst>
               <a:ext uri="{FF2B5EF4-FFF2-40B4-BE49-F238E27FC236}">
-                <a16:creationId xmlns:a16="http://schemas.microsoft.com/office/drawing/2014/main" id="{7578A52D-2496-4956-A9A4-EA5C38B2F1FC}"/>
+                <a16:creationId xmlns:a16="http://schemas.microsoft.com/office/drawing/2014/main" id="{79CBD3C9-4E66-426D-948E-7CF4778107E8}"/>
               </a:ext>
               <a:ext uri="{C183D7F6-B498-43B3-948B-1728B52AA6E4}">
                 <adec:decorative xmlns:adec="http://schemas.microsoft.com/office/drawing/2017/decorative" val="1"/>
@@ -25712,14 +25712,14 @@
         </p:nvSpPr>
         <p:spPr>
           <a:xfrm>
-            <a:off x="0" y="0"/>
-            <a:ext cx="18287998" cy="10286998"/>
+            <a:off x="346710" y="365760"/>
+            <a:ext cx="17586960" cy="9566908"/>
           </a:xfrm>
           <a:prstGeom prst="rect">
             <a:avLst/>
           </a:prstGeom>
           <a:solidFill>
-            <a:schemeClr val="accent1"/>
+            <a:schemeClr val="bg1"/>
           </a:solidFill>
           <a:ln w="12700">
             <a:noFill/>
@@ -25744,10 +25744,10 @@
       </p:sp>
       <p:sp>
         <p:nvSpPr>
-          <p:cNvPr id="10" name="Rectangle 9">
+          <p:cNvPr id="19" name="Rectangle 18">
             <a:extLst>
               <a:ext uri="{FF2B5EF4-FFF2-40B4-BE49-F238E27FC236}">
-                <a16:creationId xmlns:a16="http://schemas.microsoft.com/office/drawing/2014/main" id="{9809C8E2-EF9B-4E0B-A17E-836DE0508E76}"/>
+                <a16:creationId xmlns:a16="http://schemas.microsoft.com/office/drawing/2014/main" id="{DDB95FCF-AD96-482F-9FB8-CD95725E6EFF}"/>
               </a:ext>
               <a:ext uri="{C183D7F6-B498-43B3-948B-1728B52AA6E4}">
                 <adec:decorative xmlns:adec="http://schemas.microsoft.com/office/drawing/2017/decorative" val="1"/>
@@ -25767,13 +25767,15 @@
         </p:nvSpPr>
         <p:spPr>
           <a:xfrm>
-            <a:off x="482598" y="482599"/>
-            <a:ext cx="17322799" cy="2829560"/>
+            <a:off x="346710" y="365760"/>
+            <a:ext cx="17586960" cy="9566908"/>
           </a:xfrm>
           <a:prstGeom prst="rect">
             <a:avLst/>
           </a:prstGeom>
-          <a:noFill/>
+          <a:solidFill>
+            <a:schemeClr val="accent1"/>
+          </a:solidFill>
           <a:ln w="12700">
             <a:solidFill>
               <a:srgbClr val="FFFFFF"/>
@@ -25797,6 +25799,110 @@
           </a:fontRef>
         </p:style>
       </p:sp>
+      <p:cxnSp>
+        <p:nvCxnSpPr>
+          <p:cNvPr id="21" name="Straight Connector 20">
+            <a:extLst>
+              <a:ext uri="{FF2B5EF4-FFF2-40B4-BE49-F238E27FC236}">
+                <a16:creationId xmlns:a16="http://schemas.microsoft.com/office/drawing/2014/main" id="{64EEEC00-AD80-4734-BEE6-04CBDEC830C9}"/>
+              </a:ext>
+              <a:ext uri="{C183D7F6-B498-43B3-948B-1728B52AA6E4}">
+                <adec:decorative xmlns:adec="http://schemas.microsoft.com/office/drawing/2017/decorative" val="1"/>
+              </a:ext>
+            </a:extLst>
+          </p:cNvPr>
+          <p:cNvCxnSpPr>
+            <a:cxnSpLocks noGrp="1" noRot="1" noChangeAspect="1" noMove="1" noResize="1" noEditPoints="1" noAdjustHandles="1" noChangeArrowheads="1" noChangeShapeType="1"/>
+          </p:cNvCxnSpPr>
+          <p:nvPr>
+            <p:extLst>
+              <p:ext uri="{386F3935-93C4-4BCD-93E2-E3B085C9AB24}">
+                <p16:designElem xmlns:p16="http://schemas.microsoft.com/office/powerpoint/2015/main" val="1"/>
+              </p:ext>
+            </p:extLst>
+          </p:nvPr>
+        </p:nvCxnSpPr>
+        <p:spPr>
+          <a:xfrm>
+            <a:off x="2967990" y="5600700"/>
+            <a:ext cx="12344401" cy="0"/>
+          </a:xfrm>
+          <a:prstGeom prst="line">
+            <a:avLst/>
+          </a:prstGeom>
+          <a:ln>
+            <a:solidFill>
+              <a:srgbClr val="FFFFFF"/>
+            </a:solidFill>
+          </a:ln>
+        </p:spPr>
+        <p:style>
+          <a:lnRef idx="1">
+            <a:schemeClr val="accent1"/>
+          </a:lnRef>
+          <a:fillRef idx="0">
+            <a:schemeClr val="accent1"/>
+          </a:fillRef>
+          <a:effectRef idx="0">
+            <a:schemeClr val="accent1"/>
+          </a:effectRef>
+          <a:fontRef idx="minor">
+            <a:schemeClr val="tx1"/>
+          </a:fontRef>
+        </p:style>
+      </p:cxnSp>
+      <p:cxnSp>
+        <p:nvCxnSpPr>
+          <p:cNvPr id="23" name="Straight Connector 22">
+            <a:extLst>
+              <a:ext uri="{FF2B5EF4-FFF2-40B4-BE49-F238E27FC236}">
+                <a16:creationId xmlns:a16="http://schemas.microsoft.com/office/drawing/2014/main" id="{6C6896D1-BFB1-4C84-82DD-31073BED3F03}"/>
+              </a:ext>
+              <a:ext uri="{C183D7F6-B498-43B3-948B-1728B52AA6E4}">
+                <adec:decorative xmlns:adec="http://schemas.microsoft.com/office/drawing/2017/decorative" val="1"/>
+              </a:ext>
+            </a:extLst>
+          </p:cNvPr>
+          <p:cNvCxnSpPr>
+            <a:cxnSpLocks noGrp="1" noRot="1" noChangeAspect="1" noMove="1" noResize="1" noEditPoints="1" noAdjustHandles="1" noChangeArrowheads="1" noChangeShapeType="1"/>
+          </p:cNvCxnSpPr>
+          <p:nvPr>
+            <p:extLst>
+              <p:ext uri="{386F3935-93C4-4BCD-93E2-E3B085C9AB24}">
+                <p16:designElem xmlns:p16="http://schemas.microsoft.com/office/powerpoint/2015/main" val="1"/>
+              </p:ext>
+            </p:extLst>
+          </p:nvPr>
+        </p:nvCxnSpPr>
+        <p:spPr>
+          <a:xfrm>
+            <a:off x="2967990" y="8193687"/>
+            <a:ext cx="12344401" cy="0"/>
+          </a:xfrm>
+          <a:prstGeom prst="line">
+            <a:avLst/>
+          </a:prstGeom>
+          <a:ln>
+            <a:solidFill>
+              <a:srgbClr val="FFFFFF"/>
+            </a:solidFill>
+          </a:ln>
+        </p:spPr>
+        <p:style>
+          <a:lnRef idx="1">
+            <a:schemeClr val="accent1"/>
+          </a:lnRef>
+          <a:fillRef idx="0">
+            <a:schemeClr val="accent1"/>
+          </a:fillRef>
+          <a:effectRef idx="0">
+            <a:schemeClr val="accent1"/>
+          </a:effectRef>
+          <a:fontRef idx="minor">
+            <a:schemeClr val="tx1"/>
+          </a:fontRef>
+        </p:style>
+      </p:cxnSp>
       <p:sp>
         <p:nvSpPr>
           <p:cNvPr id="2" name="Title 1">
@@ -25815,18 +25921,23 @@
         </p:nvSpPr>
         <p:spPr>
           <a:xfrm>
-            <a:off x="1714500" y="914400"/>
-            <a:ext cx="14813280" cy="2034540"/>
+            <a:off x="1664970" y="6312636"/>
+            <a:ext cx="14950440" cy="1988820"/>
           </a:xfrm>
         </p:spPr>
         <p:txBody>
-          <a:bodyPr>
+          <a:bodyPr vert="horz" lIns="91440" tIns="45720" rIns="91440" bIns="45720" rtlCol="0" anchor="b">
             <a:normAutofit/>
           </a:bodyPr>
           <a:lstStyle/>
           <a:p>
+            <a:pPr algn="ctr" defTabSz="914400">
+              <a:lnSpc>
+                <a:spcPct val="85000"/>
+              </a:lnSpc>
+            </a:pPr>
             <a:r>
-              <a:rPr lang="en-CA" dirty="0">
+              <a:rPr lang="en-US" sz="6900" b="1" cap="all">
                 <a:solidFill>
                   <a:srgbClr val="FFFFFF"/>
                 </a:solidFill>
@@ -25836,12 +25947,12 @@
           </a:p>
         </p:txBody>
       </p:sp>
-      <p:sp useBgFill="1">
+      <p:sp>
         <p:nvSpPr>
-          <p:cNvPr id="12" name="Rectangle 11">
+          <p:cNvPr id="25" name="Rectangle 24">
             <a:extLst>
               <a:ext uri="{FF2B5EF4-FFF2-40B4-BE49-F238E27FC236}">
-                <a16:creationId xmlns:a16="http://schemas.microsoft.com/office/drawing/2014/main" id="{61EB557E-621E-4254-B750-85274C5F4D5C}"/>
+                <a16:creationId xmlns:a16="http://schemas.microsoft.com/office/drawing/2014/main" id="{8A2FDFB1-2B6D-49EB-B6C0-FA923806E0AF}"/>
               </a:ext>
               <a:ext uri="{C183D7F6-B498-43B3-948B-1728B52AA6E4}">
                 <adec:decorative xmlns:adec="http://schemas.microsoft.com/office/drawing/2017/decorative" val="1"/>
@@ -25861,14 +25972,19 @@
         </p:nvSpPr>
         <p:spPr>
           <a:xfrm>
-            <a:off x="0" y="3794761"/>
-            <a:ext cx="18288000" cy="6492239"/>
+            <a:off x="346710" y="365761"/>
+            <a:ext cx="17583150" cy="5946876"/>
           </a:xfrm>
           <a:prstGeom prst="rect">
             <a:avLst/>
           </a:prstGeom>
-          <a:ln>
-            <a:noFill/>
+          <a:solidFill>
+            <a:schemeClr val="bg1"/>
+          </a:solidFill>
+          <a:ln w="12700">
+            <a:solidFill>
+              <a:srgbClr val="FFFFFF"/>
+            </a:solidFill>
           </a:ln>
         </p:spPr>
         <p:style>
@@ -25887,21 +26003,13 @@
             <a:schemeClr val="lt1"/>
           </a:fontRef>
         </p:style>
-        <p:txBody>
-          <a:bodyPr rtlCol="0" anchor="ctr"/>
-          <a:lstStyle/>
-          <a:p>
-            <a:pPr algn="ctr"/>
-            <a:endParaRPr lang="en-US"/>
-          </a:p>
-        </p:txBody>
       </p:sp>
       <p:pic>
         <p:nvPicPr>
-          <p:cNvPr id="5" name="Content Placeholder 4">
+          <p:cNvPr id="11" name="Content Placeholder 10">
             <a:extLst>
               <a:ext uri="{FF2B5EF4-FFF2-40B4-BE49-F238E27FC236}">
-                <a16:creationId xmlns:a16="http://schemas.microsoft.com/office/drawing/2014/main" id="{B93FC5CB-83DA-FD69-6A32-1ED9A3D7C355}"/>
+                <a16:creationId xmlns:a16="http://schemas.microsoft.com/office/drawing/2014/main" id="{F5DCE0C2-96EA-EC20-DC0A-1361CBF2FA1E}"/>
               </a:ext>
             </a:extLst>
           </p:cNvPr>
@@ -25920,9 +26028,12 @@
         </p:blipFill>
         <p:spPr>
           <a:xfrm>
-            <a:off x="2819400" y="4381500"/>
-            <a:ext cx="12908706" cy="3886200"/>
+            <a:off x="2460383" y="1092708"/>
+            <a:ext cx="13355802" cy="4540974"/>
           </a:xfrm>
+          <a:prstGeom prst="rect">
+            <a:avLst/>
+          </a:prstGeom>
         </p:spPr>
       </p:pic>
     </p:spTree>

</xml_diff>